<commit_message>
Added : - mood selecter XML - Error messages when Username is taken - Error messages when Username is not entered - Error messages when Password is  not entered - Checks Username/Password against firebase and  either logs in or displays Error Message
</commit_message>
<xml_diff>
--- a/Proposal Sketches/Screen Sketchups.pptx
+++ b/Proposal Sketches/Screen Sketchups.pptx
@@ -11,6 +11,7 @@
     <p:sldId id="258" r:id="rId5"/>
     <p:sldId id="259" r:id="rId6"/>
     <p:sldId id="261" r:id="rId7"/>
+    <p:sldId id="262" r:id="rId8"/>
   </p:sldIdLst>
   <p:sldSz cx="12192000" cy="6858000"/>
   <p:notesSz cx="6858000" cy="9144000"/>
@@ -1870,7 +1871,7 @@
           <a:p>
             <a:fld id="{87FCEB07-5853-4FE3-8E75-65E7B8468CF1}" type="datetimeFigureOut">
               <a:rPr lang="en-GB" smtClean="0"/>
-              <a:t>08/03/2022</a:t>
+              <a:t>20/04/2022</a:t>
             </a:fld>
             <a:endParaRPr lang="en-GB"/>
           </a:p>
@@ -2070,7 +2071,7 @@
           <a:p>
             <a:fld id="{87FCEB07-5853-4FE3-8E75-65E7B8468CF1}" type="datetimeFigureOut">
               <a:rPr lang="en-GB" smtClean="0"/>
-              <a:t>08/03/2022</a:t>
+              <a:t>20/04/2022</a:t>
             </a:fld>
             <a:endParaRPr lang="en-GB"/>
           </a:p>
@@ -2280,7 +2281,7 @@
           <a:p>
             <a:fld id="{87FCEB07-5853-4FE3-8E75-65E7B8468CF1}" type="datetimeFigureOut">
               <a:rPr lang="en-GB" smtClean="0"/>
-              <a:t>08/03/2022</a:t>
+              <a:t>20/04/2022</a:t>
             </a:fld>
             <a:endParaRPr lang="en-GB"/>
           </a:p>
@@ -2480,7 +2481,7 @@
           <a:p>
             <a:fld id="{87FCEB07-5853-4FE3-8E75-65E7B8468CF1}" type="datetimeFigureOut">
               <a:rPr lang="en-GB" smtClean="0"/>
-              <a:t>08/03/2022</a:t>
+              <a:t>20/04/2022</a:t>
             </a:fld>
             <a:endParaRPr lang="en-GB"/>
           </a:p>
@@ -2756,7 +2757,7 @@
           <a:p>
             <a:fld id="{87FCEB07-5853-4FE3-8E75-65E7B8468CF1}" type="datetimeFigureOut">
               <a:rPr lang="en-GB" smtClean="0"/>
-              <a:t>08/03/2022</a:t>
+              <a:t>20/04/2022</a:t>
             </a:fld>
             <a:endParaRPr lang="en-GB"/>
           </a:p>
@@ -3024,7 +3025,7 @@
           <a:p>
             <a:fld id="{87FCEB07-5853-4FE3-8E75-65E7B8468CF1}" type="datetimeFigureOut">
               <a:rPr lang="en-GB" smtClean="0"/>
-              <a:t>08/03/2022</a:t>
+              <a:t>20/04/2022</a:t>
             </a:fld>
             <a:endParaRPr lang="en-GB"/>
           </a:p>
@@ -3439,7 +3440,7 @@
           <a:p>
             <a:fld id="{87FCEB07-5853-4FE3-8E75-65E7B8468CF1}" type="datetimeFigureOut">
               <a:rPr lang="en-GB" smtClean="0"/>
-              <a:t>08/03/2022</a:t>
+              <a:t>20/04/2022</a:t>
             </a:fld>
             <a:endParaRPr lang="en-GB"/>
           </a:p>
@@ -3581,7 +3582,7 @@
           <a:p>
             <a:fld id="{87FCEB07-5853-4FE3-8E75-65E7B8468CF1}" type="datetimeFigureOut">
               <a:rPr lang="en-GB" smtClean="0"/>
-              <a:t>08/03/2022</a:t>
+              <a:t>20/04/2022</a:t>
             </a:fld>
             <a:endParaRPr lang="en-GB"/>
           </a:p>
@@ -3694,7 +3695,7 @@
           <a:p>
             <a:fld id="{87FCEB07-5853-4FE3-8E75-65E7B8468CF1}" type="datetimeFigureOut">
               <a:rPr lang="en-GB" smtClean="0"/>
-              <a:t>08/03/2022</a:t>
+              <a:t>20/04/2022</a:t>
             </a:fld>
             <a:endParaRPr lang="en-GB"/>
           </a:p>
@@ -4007,7 +4008,7 @@
           <a:p>
             <a:fld id="{87FCEB07-5853-4FE3-8E75-65E7B8468CF1}" type="datetimeFigureOut">
               <a:rPr lang="en-GB" smtClean="0"/>
-              <a:t>08/03/2022</a:t>
+              <a:t>20/04/2022</a:t>
             </a:fld>
             <a:endParaRPr lang="en-GB"/>
           </a:p>
@@ -4296,7 +4297,7 @@
           <a:p>
             <a:fld id="{87FCEB07-5853-4FE3-8E75-65E7B8468CF1}" type="datetimeFigureOut">
               <a:rPr lang="en-GB" smtClean="0"/>
-              <a:t>08/03/2022</a:t>
+              <a:t>20/04/2022</a:t>
             </a:fld>
             <a:endParaRPr lang="en-GB"/>
           </a:p>
@@ -4539,7 +4540,7 @@
           <a:p>
             <a:fld id="{87FCEB07-5853-4FE3-8E75-65E7B8468CF1}" type="datetimeFigureOut">
               <a:rPr lang="en-GB" smtClean="0"/>
-              <a:t>08/03/2022</a:t>
+              <a:t>20/04/2022</a:t>
             </a:fld>
             <a:endParaRPr lang="en-GB"/>
           </a:p>
@@ -5919,12 +5920,66 @@
           <a:chExt cx="0" cy="0"/>
         </a:xfrm>
       </p:grpSpPr>
+      <p:sp>
+        <p:nvSpPr>
+          <p:cNvPr id="5" name="Rectangle: Rounded Corners 4">
+            <a:extLst>
+              <a:ext uri="{FF2B5EF4-FFF2-40B4-BE49-F238E27FC236}">
+                <a16:creationId xmlns:a16="http://schemas.microsoft.com/office/drawing/2014/main" id="{B225F021-1C01-46A0-8D54-F8372DE0B72F}"/>
+              </a:ext>
+            </a:extLst>
+          </p:cNvPr>
+          <p:cNvSpPr/>
+          <p:nvPr/>
+        </p:nvSpPr>
+        <p:spPr>
+          <a:xfrm>
+            <a:off x="478657" y="944536"/>
+            <a:ext cx="2441359" cy="4571750"/>
+          </a:xfrm>
+          <a:prstGeom prst="roundRect">
+            <a:avLst/>
+          </a:prstGeom>
+          <a:solidFill>
+            <a:schemeClr val="bg1"/>
+          </a:solidFill>
+          <a:ln w="57150">
+            <a:solidFill>
+              <a:schemeClr val="tx1"/>
+            </a:solidFill>
+          </a:ln>
+        </p:spPr>
+        <p:style>
+          <a:lnRef idx="2">
+            <a:schemeClr val="accent1">
+              <a:shade val="50000"/>
+            </a:schemeClr>
+          </a:lnRef>
+          <a:fillRef idx="1">
+            <a:schemeClr val="accent1"/>
+          </a:fillRef>
+          <a:effectRef idx="0">
+            <a:schemeClr val="accent1"/>
+          </a:effectRef>
+          <a:fontRef idx="minor">
+            <a:schemeClr val="lt1"/>
+          </a:fontRef>
+        </p:style>
+        <p:txBody>
+          <a:bodyPr rtlCol="0" anchor="ctr"/>
+          <a:lstStyle/>
+          <a:p>
+            <a:pPr algn="ctr"/>
+            <a:endParaRPr lang="en-GB" dirty="0"/>
+          </a:p>
+        </p:txBody>
+      </p:sp>
       <p:grpSp>
         <p:nvGrpSpPr>
-          <p:cNvPr id="30" name="Group 29">
+          <p:cNvPr id="3" name="Group 2">
             <a:extLst>
               <a:ext uri="{FF2B5EF4-FFF2-40B4-BE49-F238E27FC236}">
-                <a16:creationId xmlns:a16="http://schemas.microsoft.com/office/drawing/2014/main" id="{40AF6516-1F13-474C-8202-E577E87E57F5}"/>
+                <a16:creationId xmlns:a16="http://schemas.microsoft.com/office/drawing/2014/main" id="{4E3E2D30-FD90-4508-B5DB-E119E2916A57}"/>
               </a:ext>
             </a:extLst>
           </p:cNvPr>
@@ -5933,66 +5988,12 @@
         </p:nvGrpSpPr>
         <p:grpSpPr>
           <a:xfrm>
-            <a:off x="478657" y="944536"/>
-            <a:ext cx="2441359" cy="4571750"/>
-            <a:chOff x="1864311" y="1012055"/>
-            <a:chExt cx="2441359" cy="4571750"/>
+            <a:off x="723760" y="1153956"/>
+            <a:ext cx="1957998" cy="4189862"/>
+            <a:chOff x="723760" y="1153956"/>
+            <a:chExt cx="1957998" cy="4189862"/>
           </a:xfrm>
         </p:grpSpPr>
-        <p:sp>
-          <p:nvSpPr>
-            <p:cNvPr id="5" name="Rectangle: Rounded Corners 4">
-              <a:extLst>
-                <a:ext uri="{FF2B5EF4-FFF2-40B4-BE49-F238E27FC236}">
-                  <a16:creationId xmlns:a16="http://schemas.microsoft.com/office/drawing/2014/main" id="{B225F021-1C01-46A0-8D54-F8372DE0B72F}"/>
-                </a:ext>
-              </a:extLst>
-            </p:cNvPr>
-            <p:cNvSpPr/>
-            <p:nvPr/>
-          </p:nvSpPr>
-          <p:spPr>
-            <a:xfrm>
-              <a:off x="1864311" y="1012055"/>
-              <a:ext cx="2441359" cy="4571750"/>
-            </a:xfrm>
-            <a:prstGeom prst="roundRect">
-              <a:avLst/>
-            </a:prstGeom>
-            <a:solidFill>
-              <a:schemeClr val="bg1"/>
-            </a:solidFill>
-            <a:ln w="57150">
-              <a:solidFill>
-                <a:schemeClr val="tx1"/>
-              </a:solidFill>
-            </a:ln>
-          </p:spPr>
-          <p:style>
-            <a:lnRef idx="2">
-              <a:schemeClr val="accent1">
-                <a:shade val="50000"/>
-              </a:schemeClr>
-            </a:lnRef>
-            <a:fillRef idx="1">
-              <a:schemeClr val="accent1"/>
-            </a:fillRef>
-            <a:effectRef idx="0">
-              <a:schemeClr val="accent1"/>
-            </a:effectRef>
-            <a:fontRef idx="minor">
-              <a:schemeClr val="lt1"/>
-            </a:fontRef>
-          </p:style>
-          <p:txBody>
-            <a:bodyPr rtlCol="0" anchor="ctr"/>
-            <a:lstStyle/>
-            <a:p>
-              <a:pPr algn="ctr"/>
-              <a:endParaRPr lang="en-GB" dirty="0"/>
-            </a:p>
-          </p:txBody>
-        </p:sp>
         <p:grpSp>
           <p:nvGrpSpPr>
             <p:cNvPr id="22" name="Group 21">
@@ -6007,7 +6008,7 @@
           </p:nvGrpSpPr>
           <p:grpSpPr>
             <a:xfrm>
-              <a:off x="2109414" y="1221475"/>
+              <a:off x="723760" y="1153956"/>
               <a:ext cx="1957998" cy="4189862"/>
               <a:chOff x="2109414" y="3125816"/>
               <a:chExt cx="1957998" cy="2223074"/>
@@ -6365,7 +6366,7 @@
           </p:blipFill>
           <p:spPr>
             <a:xfrm>
-              <a:off x="2880118" y="2011715"/>
+              <a:off x="1494464" y="1944196"/>
               <a:ext cx="423437" cy="465458"/>
             </a:xfrm>
             <a:prstGeom prst="rect">
@@ -6400,7 +6401,7 @@
           </p:blipFill>
           <p:spPr>
             <a:xfrm>
-              <a:off x="2857104" y="2746041"/>
+              <a:off x="1471450" y="2678522"/>
               <a:ext cx="469463" cy="431642"/>
             </a:xfrm>
             <a:prstGeom prst="rect">
@@ -6435,7 +6436,7 @@
           </p:blipFill>
           <p:spPr>
             <a:xfrm>
-              <a:off x="2877803" y="3429000"/>
+              <a:off x="1492149" y="3361481"/>
               <a:ext cx="425752" cy="500649"/>
             </a:xfrm>
             <a:prstGeom prst="rect">
@@ -6470,7 +6471,7 @@
           </p:blipFill>
           <p:spPr>
             <a:xfrm>
-              <a:off x="2863593" y="4175819"/>
+              <a:off x="1477939" y="4108300"/>
               <a:ext cx="456484" cy="466859"/>
             </a:xfrm>
             <a:prstGeom prst="rect">
@@ -6505,7 +6506,7 @@
           </p:blipFill>
           <p:spPr>
             <a:xfrm>
-              <a:off x="2837538" y="4901524"/>
+              <a:off x="1451884" y="4834005"/>
               <a:ext cx="489029" cy="447961"/>
             </a:xfrm>
             <a:prstGeom prst="rect">
@@ -6535,7 +6536,7 @@
           </p:blipFill>
           <p:spPr>
             <a:xfrm>
-              <a:off x="2963295" y="1302799"/>
+              <a:off x="1577641" y="1235280"/>
               <a:ext cx="243386" cy="360112"/>
             </a:xfrm>
             <a:prstGeom prst="rect">
@@ -12783,6 +12784,691 @@
 </p:sld>
 </file>
 
+<file path=ppt/slides/slide7.xml><?xml version="1.0" encoding="utf-8"?>
+<p:sld xmlns:a="http://schemas.openxmlformats.org/drawingml/2006/main" xmlns:r="http://schemas.openxmlformats.org/officeDocument/2006/relationships" xmlns:p="http://schemas.openxmlformats.org/presentationml/2006/main">
+  <p:cSld>
+    <p:spTree>
+      <p:nvGrpSpPr>
+        <p:cNvPr id="1" name=""/>
+        <p:cNvGrpSpPr/>
+        <p:nvPr/>
+      </p:nvGrpSpPr>
+      <p:grpSpPr>
+        <a:xfrm>
+          <a:off x="0" y="0"/>
+          <a:ext cx="0" cy="0"/>
+          <a:chOff x="0" y="0"/>
+          <a:chExt cx="0" cy="0"/>
+        </a:xfrm>
+      </p:grpSpPr>
+      <p:grpSp>
+        <p:nvGrpSpPr>
+          <p:cNvPr id="19" name="Group 18">
+            <a:extLst>
+              <a:ext uri="{FF2B5EF4-FFF2-40B4-BE49-F238E27FC236}">
+                <a16:creationId xmlns:a16="http://schemas.microsoft.com/office/drawing/2014/main" id="{BF29A7CE-D4C9-4E21-8948-D1689FF68D92}"/>
+              </a:ext>
+            </a:extLst>
+          </p:cNvPr>
+          <p:cNvGrpSpPr/>
+          <p:nvPr/>
+        </p:nvGrpSpPr>
+        <p:grpSpPr>
+          <a:xfrm>
+            <a:off x="1856275" y="1701579"/>
+            <a:ext cx="1951149" cy="554858"/>
+            <a:chOff x="1856275" y="1701579"/>
+            <a:chExt cx="1951149" cy="554858"/>
+          </a:xfrm>
+        </p:grpSpPr>
+        <p:sp>
+          <p:nvSpPr>
+            <p:cNvPr id="16" name="Rectangle: Rounded Corners 15">
+              <a:extLst>
+                <a:ext uri="{FF2B5EF4-FFF2-40B4-BE49-F238E27FC236}">
+                  <a16:creationId xmlns:a16="http://schemas.microsoft.com/office/drawing/2014/main" id="{AC9A3839-82A2-408D-BA93-E254D08649CB}"/>
+                </a:ext>
+              </a:extLst>
+            </p:cNvPr>
+            <p:cNvSpPr/>
+            <p:nvPr/>
+          </p:nvSpPr>
+          <p:spPr>
+            <a:xfrm>
+              <a:off x="1856275" y="1701579"/>
+              <a:ext cx="1951149" cy="554858"/>
+            </a:xfrm>
+            <a:prstGeom prst="roundRect">
+              <a:avLst/>
+            </a:prstGeom>
+            <a:solidFill>
+              <a:schemeClr val="bg1"/>
+            </a:solidFill>
+            <a:ln w="38100">
+              <a:solidFill>
+                <a:schemeClr val="tx1"/>
+              </a:solidFill>
+            </a:ln>
+          </p:spPr>
+          <p:style>
+            <a:lnRef idx="2">
+              <a:schemeClr val="accent1">
+                <a:shade val="50000"/>
+              </a:schemeClr>
+            </a:lnRef>
+            <a:fillRef idx="1">
+              <a:schemeClr val="accent1"/>
+            </a:fillRef>
+            <a:effectRef idx="0">
+              <a:schemeClr val="accent1"/>
+            </a:effectRef>
+            <a:fontRef idx="minor">
+              <a:schemeClr val="lt1"/>
+            </a:fontRef>
+          </p:style>
+          <p:txBody>
+            <a:bodyPr rtlCol="0" anchor="ctr"/>
+            <a:lstStyle/>
+            <a:p>
+              <a:pPr algn="ctr"/>
+              <a:endParaRPr lang="en-GB" dirty="0"/>
+            </a:p>
+          </p:txBody>
+        </p:sp>
+        <p:pic>
+          <p:nvPicPr>
+            <p:cNvPr id="6" name="Picture 5" descr="Shape, circle&#10;&#10;Description automatically generated">
+              <a:extLst>
+                <a:ext uri="{FF2B5EF4-FFF2-40B4-BE49-F238E27FC236}">
+                  <a16:creationId xmlns:a16="http://schemas.microsoft.com/office/drawing/2014/main" id="{2F638285-1FCB-4F9B-83C6-27DAB215EC8E}"/>
+                </a:ext>
+              </a:extLst>
+            </p:cNvPr>
+            <p:cNvPicPr>
+              <a:picLocks noChangeAspect="1"/>
+            </p:cNvPicPr>
+            <p:nvPr/>
+          </p:nvPicPr>
+          <p:blipFill rotWithShape="1">
+            <a:blip r:embed="rId2">
+              <a:extLst>
+                <a:ext uri="{28A0092B-C50C-407E-A947-70E740481C1C}">
+                  <a14:useLocalDpi xmlns:a14="http://schemas.microsoft.com/office/drawing/2010/main" val="0"/>
+                </a:ext>
+              </a:extLst>
+            </a:blip>
+            <a:srcRect l="5483" t="25988" r="76409" b="50000"/>
+            <a:stretch/>
+          </p:blipFill>
+          <p:spPr>
+            <a:xfrm>
+              <a:off x="2626978" y="1759639"/>
+              <a:ext cx="423437" cy="465458"/>
+            </a:xfrm>
+            <a:prstGeom prst="rect">
+              <a:avLst/>
+            </a:prstGeom>
+          </p:spPr>
+        </p:pic>
+      </p:grpSp>
+      <p:grpSp>
+        <p:nvGrpSpPr>
+          <p:cNvPr id="20" name="Group 19">
+            <a:extLst>
+              <a:ext uri="{FF2B5EF4-FFF2-40B4-BE49-F238E27FC236}">
+                <a16:creationId xmlns:a16="http://schemas.microsoft.com/office/drawing/2014/main" id="{B4A967CE-CFE5-458B-8D93-167FB35647BA}"/>
+              </a:ext>
+            </a:extLst>
+          </p:cNvPr>
+          <p:cNvGrpSpPr/>
+          <p:nvPr/>
+        </p:nvGrpSpPr>
+        <p:grpSpPr>
+          <a:xfrm>
+            <a:off x="1863123" y="2427285"/>
+            <a:ext cx="1951149" cy="554858"/>
+            <a:chOff x="1863123" y="2427285"/>
+            <a:chExt cx="1951149" cy="554858"/>
+          </a:xfrm>
+        </p:grpSpPr>
+        <p:sp>
+          <p:nvSpPr>
+            <p:cNvPr id="15" name="Rectangle: Rounded Corners 14">
+              <a:extLst>
+                <a:ext uri="{FF2B5EF4-FFF2-40B4-BE49-F238E27FC236}">
+                  <a16:creationId xmlns:a16="http://schemas.microsoft.com/office/drawing/2014/main" id="{F66161CA-AFC8-4493-B17F-BAF8D31A79DF}"/>
+                </a:ext>
+              </a:extLst>
+            </p:cNvPr>
+            <p:cNvSpPr/>
+            <p:nvPr/>
+          </p:nvSpPr>
+          <p:spPr>
+            <a:xfrm>
+              <a:off x="1863123" y="2427285"/>
+              <a:ext cx="1951149" cy="554858"/>
+            </a:xfrm>
+            <a:prstGeom prst="roundRect">
+              <a:avLst/>
+            </a:prstGeom>
+            <a:solidFill>
+              <a:schemeClr val="bg1"/>
+            </a:solidFill>
+            <a:ln w="38100">
+              <a:solidFill>
+                <a:schemeClr val="tx1"/>
+              </a:solidFill>
+            </a:ln>
+          </p:spPr>
+          <p:style>
+            <a:lnRef idx="2">
+              <a:schemeClr val="accent1">
+                <a:shade val="50000"/>
+              </a:schemeClr>
+            </a:lnRef>
+            <a:fillRef idx="1">
+              <a:schemeClr val="accent1"/>
+            </a:fillRef>
+            <a:effectRef idx="0">
+              <a:schemeClr val="accent1"/>
+            </a:effectRef>
+            <a:fontRef idx="minor">
+              <a:schemeClr val="lt1"/>
+            </a:fontRef>
+          </p:style>
+          <p:txBody>
+            <a:bodyPr rtlCol="0" anchor="ctr"/>
+            <a:lstStyle/>
+            <a:p>
+              <a:pPr algn="ctr"/>
+              <a:endParaRPr lang="en-GB" dirty="0"/>
+            </a:p>
+          </p:txBody>
+        </p:sp>
+        <p:pic>
+          <p:nvPicPr>
+            <p:cNvPr id="7" name="Picture 6" descr="Shape, circle&#10;&#10;Description automatically generated">
+              <a:extLst>
+                <a:ext uri="{FF2B5EF4-FFF2-40B4-BE49-F238E27FC236}">
+                  <a16:creationId xmlns:a16="http://schemas.microsoft.com/office/drawing/2014/main" id="{C089E74A-1758-4E8E-BDE3-C2780D8843CA}"/>
+                </a:ext>
+              </a:extLst>
+            </p:cNvPr>
+            <p:cNvPicPr>
+              <a:picLocks noChangeAspect="1"/>
+            </p:cNvPicPr>
+            <p:nvPr/>
+          </p:nvPicPr>
+          <p:blipFill rotWithShape="1">
+            <a:blip r:embed="rId2">
+              <a:extLst>
+                <a:ext uri="{28A0092B-C50C-407E-A947-70E740481C1C}">
+                  <a14:useLocalDpi xmlns:a14="http://schemas.microsoft.com/office/drawing/2010/main" val="0"/>
+                </a:ext>
+              </a:extLst>
+            </a:blip>
+            <a:srcRect l="23406" t="28188" r="58486" b="51727"/>
+            <a:stretch/>
+          </p:blipFill>
+          <p:spPr>
+            <a:xfrm>
+              <a:off x="2603964" y="2493965"/>
+              <a:ext cx="469463" cy="431642"/>
+            </a:xfrm>
+            <a:prstGeom prst="rect">
+              <a:avLst/>
+            </a:prstGeom>
+          </p:spPr>
+        </p:pic>
+      </p:grpSp>
+      <p:grpSp>
+        <p:nvGrpSpPr>
+          <p:cNvPr id="21" name="Group 20">
+            <a:extLst>
+              <a:ext uri="{FF2B5EF4-FFF2-40B4-BE49-F238E27FC236}">
+                <a16:creationId xmlns:a16="http://schemas.microsoft.com/office/drawing/2014/main" id="{41B3E53A-2BFD-4405-A125-FE326B0094F3}"/>
+              </a:ext>
+            </a:extLst>
+          </p:cNvPr>
+          <p:cNvGrpSpPr/>
+          <p:nvPr/>
+        </p:nvGrpSpPr>
+        <p:grpSpPr>
+          <a:xfrm>
+            <a:off x="1863123" y="3152991"/>
+            <a:ext cx="1951149" cy="554858"/>
+            <a:chOff x="1863123" y="3152991"/>
+            <a:chExt cx="1951149" cy="554858"/>
+          </a:xfrm>
+        </p:grpSpPr>
+        <p:sp>
+          <p:nvSpPr>
+            <p:cNvPr id="14" name="Rectangle: Rounded Corners 13">
+              <a:extLst>
+                <a:ext uri="{FF2B5EF4-FFF2-40B4-BE49-F238E27FC236}">
+                  <a16:creationId xmlns:a16="http://schemas.microsoft.com/office/drawing/2014/main" id="{8CD05A9B-4EE8-486F-ABE4-91A4A418E3DB}"/>
+                </a:ext>
+              </a:extLst>
+            </p:cNvPr>
+            <p:cNvSpPr/>
+            <p:nvPr/>
+          </p:nvSpPr>
+          <p:spPr>
+            <a:xfrm>
+              <a:off x="1863123" y="3152991"/>
+              <a:ext cx="1951149" cy="554858"/>
+            </a:xfrm>
+            <a:prstGeom prst="roundRect">
+              <a:avLst/>
+            </a:prstGeom>
+            <a:solidFill>
+              <a:schemeClr val="bg1"/>
+            </a:solidFill>
+            <a:ln w="38100">
+              <a:solidFill>
+                <a:schemeClr val="tx1"/>
+              </a:solidFill>
+            </a:ln>
+          </p:spPr>
+          <p:style>
+            <a:lnRef idx="2">
+              <a:schemeClr val="accent1">
+                <a:shade val="50000"/>
+              </a:schemeClr>
+            </a:lnRef>
+            <a:fillRef idx="1">
+              <a:schemeClr val="accent1"/>
+            </a:fillRef>
+            <a:effectRef idx="0">
+              <a:schemeClr val="accent1"/>
+            </a:effectRef>
+            <a:fontRef idx="minor">
+              <a:schemeClr val="lt1"/>
+            </a:fontRef>
+          </p:style>
+          <p:txBody>
+            <a:bodyPr rtlCol="0" anchor="ctr"/>
+            <a:lstStyle/>
+            <a:p>
+              <a:pPr algn="ctr"/>
+              <a:endParaRPr lang="en-GB" dirty="0"/>
+            </a:p>
+          </p:txBody>
+        </p:sp>
+        <p:pic>
+          <p:nvPicPr>
+            <p:cNvPr id="8" name="Picture 7" descr="Shape, circle&#10;&#10;Description automatically generated">
+              <a:extLst>
+                <a:ext uri="{FF2B5EF4-FFF2-40B4-BE49-F238E27FC236}">
+                  <a16:creationId xmlns:a16="http://schemas.microsoft.com/office/drawing/2014/main" id="{ADD0028F-75C5-4C4F-BFA8-49BC2A9AD755}"/>
+                </a:ext>
+              </a:extLst>
+            </p:cNvPr>
+            <p:cNvPicPr>
+              <a:picLocks noChangeAspect="1"/>
+            </p:cNvPicPr>
+            <p:nvPr/>
+          </p:nvPicPr>
+          <p:blipFill rotWithShape="1">
+            <a:blip r:embed="rId2">
+              <a:extLst>
+                <a:ext uri="{28A0092B-C50C-407E-A947-70E740481C1C}">
+                  <a14:useLocalDpi xmlns:a14="http://schemas.microsoft.com/office/drawing/2010/main" val="0"/>
+                </a:ext>
+              </a:extLst>
+            </a:blip>
+            <a:srcRect l="41818" t="25988" r="41255" b="50000"/>
+            <a:stretch/>
+          </p:blipFill>
+          <p:spPr>
+            <a:xfrm>
+              <a:off x="2624663" y="3176924"/>
+              <a:ext cx="425752" cy="500649"/>
+            </a:xfrm>
+            <a:prstGeom prst="rect">
+              <a:avLst/>
+            </a:prstGeom>
+          </p:spPr>
+        </p:pic>
+      </p:grpSp>
+      <p:grpSp>
+        <p:nvGrpSpPr>
+          <p:cNvPr id="22" name="Group 21">
+            <a:extLst>
+              <a:ext uri="{FF2B5EF4-FFF2-40B4-BE49-F238E27FC236}">
+                <a16:creationId xmlns:a16="http://schemas.microsoft.com/office/drawing/2014/main" id="{A287F7D3-438E-4F99-8AD3-CCCCB8E347F5}"/>
+              </a:ext>
+            </a:extLst>
+          </p:cNvPr>
+          <p:cNvGrpSpPr/>
+          <p:nvPr/>
+        </p:nvGrpSpPr>
+        <p:grpSpPr>
+          <a:xfrm>
+            <a:off x="1863123" y="3878697"/>
+            <a:ext cx="1951149" cy="554858"/>
+            <a:chOff x="1863123" y="3878697"/>
+            <a:chExt cx="1951149" cy="554858"/>
+          </a:xfrm>
+        </p:grpSpPr>
+        <p:sp>
+          <p:nvSpPr>
+            <p:cNvPr id="13" name="Rectangle: Rounded Corners 12">
+              <a:extLst>
+                <a:ext uri="{FF2B5EF4-FFF2-40B4-BE49-F238E27FC236}">
+                  <a16:creationId xmlns:a16="http://schemas.microsoft.com/office/drawing/2014/main" id="{E85ECD46-B26E-481E-B4D7-34C2401511B5}"/>
+                </a:ext>
+              </a:extLst>
+            </p:cNvPr>
+            <p:cNvSpPr/>
+            <p:nvPr/>
+          </p:nvSpPr>
+          <p:spPr>
+            <a:xfrm>
+              <a:off x="1863123" y="3878697"/>
+              <a:ext cx="1951149" cy="554858"/>
+            </a:xfrm>
+            <a:prstGeom prst="roundRect">
+              <a:avLst/>
+            </a:prstGeom>
+            <a:solidFill>
+              <a:schemeClr val="bg1"/>
+            </a:solidFill>
+            <a:ln w="38100">
+              <a:solidFill>
+                <a:schemeClr val="tx1"/>
+              </a:solidFill>
+            </a:ln>
+          </p:spPr>
+          <p:style>
+            <a:lnRef idx="2">
+              <a:schemeClr val="accent1">
+                <a:shade val="50000"/>
+              </a:schemeClr>
+            </a:lnRef>
+            <a:fillRef idx="1">
+              <a:schemeClr val="accent1"/>
+            </a:fillRef>
+            <a:effectRef idx="0">
+              <a:schemeClr val="accent1"/>
+            </a:effectRef>
+            <a:fontRef idx="minor">
+              <a:schemeClr val="lt1"/>
+            </a:fontRef>
+          </p:style>
+          <p:txBody>
+            <a:bodyPr rtlCol="0" anchor="ctr"/>
+            <a:lstStyle/>
+            <a:p>
+              <a:pPr algn="ctr"/>
+              <a:endParaRPr lang="en-GB" dirty="0"/>
+            </a:p>
+          </p:txBody>
+        </p:sp>
+        <p:pic>
+          <p:nvPicPr>
+            <p:cNvPr id="9" name="Picture 8" descr="Shape, circle&#10;&#10;Description automatically generated">
+              <a:extLst>
+                <a:ext uri="{FF2B5EF4-FFF2-40B4-BE49-F238E27FC236}">
+                  <a16:creationId xmlns:a16="http://schemas.microsoft.com/office/drawing/2014/main" id="{5867BED5-CFAE-412E-AABC-A94B4148588F}"/>
+                </a:ext>
+              </a:extLst>
+            </p:cNvPr>
+            <p:cNvPicPr>
+              <a:picLocks noChangeAspect="1"/>
+            </p:cNvPicPr>
+            <p:nvPr/>
+          </p:nvPicPr>
+          <p:blipFill rotWithShape="1">
+            <a:blip r:embed="rId2">
+              <a:extLst>
+                <a:ext uri="{28A0092B-C50C-407E-A947-70E740481C1C}">
+                  <a14:useLocalDpi xmlns:a14="http://schemas.microsoft.com/office/drawing/2010/main" val="0"/>
+                </a:ext>
+              </a:extLst>
+            </a:blip>
+            <a:srcRect l="59604" t="27390" r="23469" b="51726"/>
+            <a:stretch/>
+          </p:blipFill>
+          <p:spPr>
+            <a:xfrm>
+              <a:off x="2610453" y="3923743"/>
+              <a:ext cx="456484" cy="466859"/>
+            </a:xfrm>
+            <a:prstGeom prst="rect">
+              <a:avLst/>
+            </a:prstGeom>
+          </p:spPr>
+        </p:pic>
+      </p:grpSp>
+      <p:grpSp>
+        <p:nvGrpSpPr>
+          <p:cNvPr id="23" name="Group 22">
+            <a:extLst>
+              <a:ext uri="{FF2B5EF4-FFF2-40B4-BE49-F238E27FC236}">
+                <a16:creationId xmlns:a16="http://schemas.microsoft.com/office/drawing/2014/main" id="{8D32573B-B302-4497-968F-F4FDC8A2AEF1}"/>
+              </a:ext>
+            </a:extLst>
+          </p:cNvPr>
+          <p:cNvGrpSpPr/>
+          <p:nvPr/>
+        </p:nvGrpSpPr>
+        <p:grpSpPr>
+          <a:xfrm>
+            <a:off x="1863123" y="4604403"/>
+            <a:ext cx="1951149" cy="554858"/>
+            <a:chOff x="1863123" y="4604403"/>
+            <a:chExt cx="1951149" cy="554858"/>
+          </a:xfrm>
+        </p:grpSpPr>
+        <p:sp>
+          <p:nvSpPr>
+            <p:cNvPr id="12" name="Rectangle: Rounded Corners 11">
+              <a:extLst>
+                <a:ext uri="{FF2B5EF4-FFF2-40B4-BE49-F238E27FC236}">
+                  <a16:creationId xmlns:a16="http://schemas.microsoft.com/office/drawing/2014/main" id="{7E8A4A7B-C92E-4A6F-AEB1-0551AEC285BF}"/>
+                </a:ext>
+              </a:extLst>
+            </p:cNvPr>
+            <p:cNvSpPr/>
+            <p:nvPr/>
+          </p:nvSpPr>
+          <p:spPr>
+            <a:xfrm>
+              <a:off x="1863123" y="4604403"/>
+              <a:ext cx="1951149" cy="554858"/>
+            </a:xfrm>
+            <a:prstGeom prst="roundRect">
+              <a:avLst/>
+            </a:prstGeom>
+            <a:solidFill>
+              <a:schemeClr val="bg1"/>
+            </a:solidFill>
+            <a:ln w="38100">
+              <a:solidFill>
+                <a:schemeClr val="tx1"/>
+              </a:solidFill>
+            </a:ln>
+          </p:spPr>
+          <p:style>
+            <a:lnRef idx="2">
+              <a:schemeClr val="accent1">
+                <a:shade val="50000"/>
+              </a:schemeClr>
+            </a:lnRef>
+            <a:fillRef idx="1">
+              <a:schemeClr val="accent1"/>
+            </a:fillRef>
+            <a:effectRef idx="0">
+              <a:schemeClr val="accent1"/>
+            </a:effectRef>
+            <a:fontRef idx="minor">
+              <a:schemeClr val="lt1"/>
+            </a:fontRef>
+          </p:style>
+          <p:txBody>
+            <a:bodyPr rtlCol="0" anchor="ctr"/>
+            <a:lstStyle/>
+            <a:p>
+              <a:pPr algn="ctr"/>
+              <a:endParaRPr lang="en-GB" dirty="0"/>
+            </a:p>
+          </p:txBody>
+        </p:sp>
+        <p:pic>
+          <p:nvPicPr>
+            <p:cNvPr id="10" name="Picture 9" descr="Shape, circle&#10;&#10;Description automatically generated">
+              <a:extLst>
+                <a:ext uri="{FF2B5EF4-FFF2-40B4-BE49-F238E27FC236}">
+                  <a16:creationId xmlns:a16="http://schemas.microsoft.com/office/drawing/2014/main" id="{48470ADD-ACB6-4CC9-AB39-E6C8DD04E75E}"/>
+                </a:ext>
+              </a:extLst>
+            </p:cNvPr>
+            <p:cNvPicPr>
+              <a:picLocks noChangeAspect="1"/>
+            </p:cNvPicPr>
+            <p:nvPr/>
+          </p:nvPicPr>
+          <p:blipFill rotWithShape="1">
+            <a:blip r:embed="rId2">
+              <a:extLst>
+                <a:ext uri="{28A0092B-C50C-407E-A947-70E740481C1C}">
+                  <a14:useLocalDpi xmlns:a14="http://schemas.microsoft.com/office/drawing/2010/main" val="0"/>
+                </a:ext>
+              </a:extLst>
+            </a:blip>
+            <a:srcRect l="76899" t="28975" r="6174" b="52320"/>
+            <a:stretch/>
+          </p:blipFill>
+          <p:spPr>
+            <a:xfrm>
+              <a:off x="2584398" y="4649448"/>
+              <a:ext cx="489029" cy="447961"/>
+            </a:xfrm>
+            <a:prstGeom prst="rect">
+              <a:avLst/>
+            </a:prstGeom>
+          </p:spPr>
+        </p:pic>
+      </p:grpSp>
+      <p:grpSp>
+        <p:nvGrpSpPr>
+          <p:cNvPr id="18" name="Group 17">
+            <a:extLst>
+              <a:ext uri="{FF2B5EF4-FFF2-40B4-BE49-F238E27FC236}">
+                <a16:creationId xmlns:a16="http://schemas.microsoft.com/office/drawing/2014/main" id="{7C19EB8F-F961-4171-8FAF-43C81282B734}"/>
+              </a:ext>
+            </a:extLst>
+          </p:cNvPr>
+          <p:cNvGrpSpPr/>
+          <p:nvPr/>
+        </p:nvGrpSpPr>
+        <p:grpSpPr>
+          <a:xfrm>
+            <a:off x="1856274" y="969399"/>
+            <a:ext cx="1951149" cy="554858"/>
+            <a:chOff x="1856274" y="969399"/>
+            <a:chExt cx="1951149" cy="554858"/>
+          </a:xfrm>
+        </p:grpSpPr>
+        <p:sp>
+          <p:nvSpPr>
+            <p:cNvPr id="17" name="Rectangle: Rounded Corners 16">
+              <a:extLst>
+                <a:ext uri="{FF2B5EF4-FFF2-40B4-BE49-F238E27FC236}">
+                  <a16:creationId xmlns:a16="http://schemas.microsoft.com/office/drawing/2014/main" id="{2B87F8D9-AAC0-4C60-A617-213326DDBB60}"/>
+                </a:ext>
+              </a:extLst>
+            </p:cNvPr>
+            <p:cNvSpPr/>
+            <p:nvPr/>
+          </p:nvSpPr>
+          <p:spPr>
+            <a:xfrm>
+              <a:off x="1856274" y="969399"/>
+              <a:ext cx="1951149" cy="554858"/>
+            </a:xfrm>
+            <a:prstGeom prst="roundRect">
+              <a:avLst/>
+            </a:prstGeom>
+            <a:solidFill>
+              <a:schemeClr val="bg1"/>
+            </a:solidFill>
+            <a:ln w="38100">
+              <a:solidFill>
+                <a:schemeClr val="tx1"/>
+              </a:solidFill>
+            </a:ln>
+          </p:spPr>
+          <p:style>
+            <a:lnRef idx="2">
+              <a:schemeClr val="accent1">
+                <a:shade val="50000"/>
+              </a:schemeClr>
+            </a:lnRef>
+            <a:fillRef idx="1">
+              <a:schemeClr val="accent1"/>
+            </a:fillRef>
+            <a:effectRef idx="0">
+              <a:schemeClr val="accent1"/>
+            </a:effectRef>
+            <a:fontRef idx="minor">
+              <a:schemeClr val="lt1"/>
+            </a:fontRef>
+          </p:style>
+          <p:txBody>
+            <a:bodyPr rtlCol="0" anchor="ctr"/>
+            <a:lstStyle/>
+            <a:p>
+              <a:pPr algn="ctr"/>
+              <a:endParaRPr lang="en-GB" dirty="0"/>
+            </a:p>
+          </p:txBody>
+        </p:sp>
+        <p:pic>
+          <p:nvPicPr>
+            <p:cNvPr id="11" name="Picture 10">
+              <a:extLst>
+                <a:ext uri="{FF2B5EF4-FFF2-40B4-BE49-F238E27FC236}">
+                  <a16:creationId xmlns:a16="http://schemas.microsoft.com/office/drawing/2014/main" id="{53DCD2D2-6465-4A91-90AC-DBF05EFFB5D4}"/>
+                </a:ext>
+              </a:extLst>
+            </p:cNvPr>
+            <p:cNvPicPr>
+              <a:picLocks noChangeAspect="1"/>
+            </p:cNvPicPr>
+            <p:nvPr/>
+          </p:nvPicPr>
+          <p:blipFill>
+            <a:blip r:embed="rId3"/>
+            <a:stretch>
+              <a:fillRect/>
+            </a:stretch>
+          </p:blipFill>
+          <p:spPr>
+            <a:xfrm>
+              <a:off x="2710155" y="1050723"/>
+              <a:ext cx="243386" cy="360112"/>
+            </a:xfrm>
+            <a:prstGeom prst="rect">
+              <a:avLst/>
+            </a:prstGeom>
+          </p:spPr>
+        </p:pic>
+      </p:grpSp>
+    </p:spTree>
+    <p:extLst>
+      <p:ext uri="{BB962C8B-B14F-4D97-AF65-F5344CB8AC3E}">
+        <p14:creationId xmlns:p14="http://schemas.microsoft.com/office/powerpoint/2010/main" val="2245031962"/>
+      </p:ext>
+    </p:extLst>
+  </p:cSld>
+  <p:clrMapOvr>
+    <a:masterClrMapping/>
+  </p:clrMapOvr>
+</p:sld>
+</file>
+
 <file path=ppt/theme/theme1.xml><?xml version="1.0" encoding="utf-8"?>
 <a:theme xmlns:a="http://schemas.openxmlformats.org/drawingml/2006/main" name="Office Theme">
   <a:themeElements>

</xml_diff>